<commit_message>
added videos and slide edits
</commit_message>
<xml_diff>
--- a/Courses/ML_Concepts/Module_01_Introduction_to_Classification/Module_01_Introduction_to_Classification_03_LossFunction.pptx
+++ b/Courses/ML_Concepts/Module_01_Introduction_to_Classification/Module_01_Introduction_to_Classification_03_LossFunction.pptx
@@ -1,25 +1,38 @@
 
 <file path=ppt/presentation.xml><?xml version="1.0" encoding="utf-8"?>
-<p:presentation xmlns:a="http://schemas.openxmlformats.org/drawingml/2006/main" xmlns:r="http://schemas.openxmlformats.org/officeDocument/2006/relationships" xmlns:p="http://schemas.openxmlformats.org/presentationml/2006/main" saveSubsetFonts="1">
+<p:presentation xmlns:a="http://schemas.openxmlformats.org/drawingml/2006/main" xmlns:r="http://schemas.openxmlformats.org/officeDocument/2006/relationships" xmlns:p="http://schemas.openxmlformats.org/presentationml/2006/main" embedTrueTypeFonts="1" saveSubsetFonts="1">
   <p:sldMasterIdLst>
     <p:sldMasterId id="2147483648" r:id="rId1"/>
   </p:sldMasterIdLst>
   <p:notesMasterIdLst>
-    <p:notesMasterId r:id="rId11"/>
+    <p:notesMasterId r:id="rId10"/>
   </p:notesMasterIdLst>
   <p:sldIdLst>
     <p:sldId id="1995" r:id="rId2"/>
     <p:sldId id="1986" r:id="rId3"/>
     <p:sldId id="1987" r:id="rId4"/>
     <p:sldId id="1989" r:id="rId5"/>
-    <p:sldId id="1990" r:id="rId6"/>
-    <p:sldId id="1991" r:id="rId7"/>
-    <p:sldId id="1992" r:id="rId8"/>
-    <p:sldId id="1993" r:id="rId9"/>
-    <p:sldId id="1994" r:id="rId10"/>
+    <p:sldId id="1991" r:id="rId6"/>
+    <p:sldId id="1992" r:id="rId7"/>
+    <p:sldId id="1993" r:id="rId8"/>
+    <p:sldId id="1994" r:id="rId9"/>
   </p:sldIdLst>
   <p:sldSz cx="12192000" cy="6858000"/>
   <p:notesSz cx="6858000" cy="9144000"/>
+  <p:embeddedFontLst>
+    <p:embeddedFont>
+      <p:font typeface="Calibri" panose="020F0502020204030204" pitchFamily="34" charset="0"/>
+      <p:regular r:id="rId11"/>
+      <p:bold r:id="rId12"/>
+      <p:italic r:id="rId13"/>
+      <p:boldItalic r:id="rId14"/>
+    </p:embeddedFont>
+    <p:embeddedFont>
+      <p:font typeface="Calibri Light" panose="020F0302020204030204" pitchFamily="34" charset="0"/>
+      <p:regular r:id="rId15"/>
+      <p:italic r:id="rId16"/>
+    </p:embeddedFont>
+  </p:embeddedFontLst>
   <p:defaultTextStyle>
     <a:defPPr>
       <a:defRPr lang="en-US"/>
@@ -541,7 +554,7 @@
           <a:p>
             <a:fld id="{8BF7BA16-693B-49DC-B4FA-AF7A11A8ED46}" type="datetimeFigureOut">
               <a:rPr lang="en-US" smtClean="0"/>
-              <a:t>12/13/2022</a:t>
+              <a:t>1/3/2023</a:t>
             </a:fld>
             <a:endParaRPr lang="en-US"/>
           </a:p>
@@ -955,7 +968,7 @@
           <a:p>
             <a:fld id="{D788A639-B81C-4455-ABEE-AAB245CF3941}" type="datetimeFigureOut">
               <a:rPr lang="en-US" smtClean="0"/>
-              <a:t>12/13/2022</a:t>
+              <a:t>1/3/2023</a:t>
             </a:fld>
             <a:endParaRPr lang="en-US"/>
           </a:p>
@@ -1153,7 +1166,7 @@
           <a:p>
             <a:fld id="{D788A639-B81C-4455-ABEE-AAB245CF3941}" type="datetimeFigureOut">
               <a:rPr lang="en-US" smtClean="0"/>
-              <a:t>12/13/2022</a:t>
+              <a:t>1/3/2023</a:t>
             </a:fld>
             <a:endParaRPr lang="en-US"/>
           </a:p>
@@ -1361,7 +1374,7 @@
           <a:p>
             <a:fld id="{D788A639-B81C-4455-ABEE-AAB245CF3941}" type="datetimeFigureOut">
               <a:rPr lang="en-US" smtClean="0"/>
-              <a:t>12/13/2022</a:t>
+              <a:t>1/3/2023</a:t>
             </a:fld>
             <a:endParaRPr lang="en-US"/>
           </a:p>
@@ -1559,7 +1572,7 @@
           <a:p>
             <a:fld id="{D788A639-B81C-4455-ABEE-AAB245CF3941}" type="datetimeFigureOut">
               <a:rPr lang="en-US" smtClean="0"/>
-              <a:t>12/13/2022</a:t>
+              <a:t>1/3/2023</a:t>
             </a:fld>
             <a:endParaRPr lang="en-US"/>
           </a:p>
@@ -1834,7 +1847,7 @@
           <a:p>
             <a:fld id="{D788A639-B81C-4455-ABEE-AAB245CF3941}" type="datetimeFigureOut">
               <a:rPr lang="en-US" smtClean="0"/>
-              <a:t>12/13/2022</a:t>
+              <a:t>1/3/2023</a:t>
             </a:fld>
             <a:endParaRPr lang="en-US"/>
           </a:p>
@@ -2099,7 +2112,7 @@
           <a:p>
             <a:fld id="{D788A639-B81C-4455-ABEE-AAB245CF3941}" type="datetimeFigureOut">
               <a:rPr lang="en-US" smtClean="0"/>
-              <a:t>12/13/2022</a:t>
+              <a:t>1/3/2023</a:t>
             </a:fld>
             <a:endParaRPr lang="en-US"/>
           </a:p>
@@ -2511,7 +2524,7 @@
           <a:p>
             <a:fld id="{D788A639-B81C-4455-ABEE-AAB245CF3941}" type="datetimeFigureOut">
               <a:rPr lang="en-US" smtClean="0"/>
-              <a:t>12/13/2022</a:t>
+              <a:t>1/3/2023</a:t>
             </a:fld>
             <a:endParaRPr lang="en-US"/>
           </a:p>
@@ -2652,7 +2665,7 @@
           <a:p>
             <a:fld id="{D788A639-B81C-4455-ABEE-AAB245CF3941}" type="datetimeFigureOut">
               <a:rPr lang="en-US" smtClean="0"/>
-              <a:t>12/13/2022</a:t>
+              <a:t>1/3/2023</a:t>
             </a:fld>
             <a:endParaRPr lang="en-US"/>
           </a:p>
@@ -2765,7 +2778,7 @@
           <a:p>
             <a:fld id="{D788A639-B81C-4455-ABEE-AAB245CF3941}" type="datetimeFigureOut">
               <a:rPr lang="en-US" smtClean="0"/>
-              <a:t>12/13/2022</a:t>
+              <a:t>1/3/2023</a:t>
             </a:fld>
             <a:endParaRPr lang="en-US"/>
           </a:p>
@@ -3076,7 +3089,7 @@
           <a:p>
             <a:fld id="{D788A639-B81C-4455-ABEE-AAB245CF3941}" type="datetimeFigureOut">
               <a:rPr lang="en-US" smtClean="0"/>
-              <a:t>12/13/2022</a:t>
+              <a:t>1/3/2023</a:t>
             </a:fld>
             <a:endParaRPr lang="en-US"/>
           </a:p>
@@ -3364,7 +3377,7 @@
           <a:p>
             <a:fld id="{D788A639-B81C-4455-ABEE-AAB245CF3941}" type="datetimeFigureOut">
               <a:rPr lang="en-US" smtClean="0"/>
-              <a:t>12/13/2022</a:t>
+              <a:t>1/3/2023</a:t>
             </a:fld>
             <a:endParaRPr lang="en-US"/>
           </a:p>
@@ -3605,7 +3618,7 @@
           <a:p>
             <a:fld id="{D788A639-B81C-4455-ABEE-AAB245CF3941}" type="datetimeFigureOut">
               <a:rPr lang="en-US" smtClean="0"/>
-              <a:t>12/13/2022</a:t>
+              <a:t>1/3/2023</a:t>
             </a:fld>
             <a:endParaRPr lang="en-US"/>
           </a:p>
@@ -4753,991 +4766,6 @@
 </file>
 
 <file path=ppt/slides/slide5.xml><?xml version="1.0" encoding="utf-8"?>
-<p:sld xmlns:a="http://schemas.openxmlformats.org/drawingml/2006/main" xmlns:r="http://schemas.openxmlformats.org/officeDocument/2006/relationships" xmlns:p="http://schemas.openxmlformats.org/presentationml/2006/main">
-  <p:cSld>
-    <p:spTree>
-      <p:nvGrpSpPr>
-        <p:cNvPr id="1" name=""/>
-        <p:cNvGrpSpPr/>
-        <p:nvPr/>
-      </p:nvGrpSpPr>
-      <p:grpSpPr>
-        <a:xfrm>
-          <a:off x="0" y="0"/>
-          <a:ext cx="0" cy="0"/>
-          <a:chOff x="0" y="0"/>
-          <a:chExt cx="0" cy="0"/>
-        </a:xfrm>
-      </p:grpSpPr>
-      <p:sp>
-        <p:nvSpPr>
-          <p:cNvPr id="2" name="Title 1">
-            <a:extLst>
-              <a:ext uri="{FF2B5EF4-FFF2-40B4-BE49-F238E27FC236}">
-                <a16:creationId xmlns:a16="http://schemas.microsoft.com/office/drawing/2014/main" id="{2A4ADCC4-7852-4CFB-AB28-9447A1FE33A9}"/>
-              </a:ext>
-            </a:extLst>
-          </p:cNvPr>
-          <p:cNvSpPr>
-            <a:spLocks noGrp="1"/>
-          </p:cNvSpPr>
-          <p:nvPr>
-            <p:ph type="title"/>
-          </p:nvPr>
-        </p:nvSpPr>
-        <p:spPr>
-          <a:xfrm>
-            <a:off x="838200" y="365125"/>
-            <a:ext cx="10515600" cy="709913"/>
-          </a:xfrm>
-        </p:spPr>
-        <p:txBody>
-          <a:bodyPr>
-            <a:normAutofit/>
-          </a:bodyPr>
-          <a:lstStyle/>
-          <a:p>
-            <a:r>
-              <a:rPr lang="en-US" sz="3600" dirty="0"/>
-              <a:t>Can’t use linear regression cost function</a:t>
-            </a:r>
-          </a:p>
-        </p:txBody>
-      </p:sp>
-      <p:sp>
-        <p:nvSpPr>
-          <p:cNvPr id="4" name="TextBox 3">
-            <a:extLst>
-              <a:ext uri="{FF2B5EF4-FFF2-40B4-BE49-F238E27FC236}">
-                <a16:creationId xmlns:a16="http://schemas.microsoft.com/office/drawing/2014/main" id="{8AC84ACD-635C-4D4A-ACC5-A662AF12EB0B}"/>
-              </a:ext>
-            </a:extLst>
-          </p:cNvPr>
-          <p:cNvSpPr txBox="1"/>
-          <p:nvPr/>
-        </p:nvSpPr>
-        <p:spPr>
-          <a:xfrm>
-            <a:off x="1623265" y="1553192"/>
-            <a:ext cx="3533621" cy="461665"/>
-          </a:xfrm>
-          <a:prstGeom prst="rect">
-            <a:avLst/>
-          </a:prstGeom>
-          <a:noFill/>
-        </p:spPr>
-        <p:txBody>
-          <a:bodyPr wrap="square" rtlCol="0">
-            <a:spAutoFit/>
-          </a:bodyPr>
-          <a:lstStyle/>
-          <a:p>
-            <a:r>
-              <a:rPr lang="en-US" sz="2400" dirty="0"/>
-              <a:t>Linear regression:</a:t>
-            </a:r>
-          </a:p>
-        </p:txBody>
-      </p:sp>
-      <p:pic>
-        <p:nvPicPr>
-          <p:cNvPr id="5" name="Picture 4">
-            <a:extLst>
-              <a:ext uri="{FF2B5EF4-FFF2-40B4-BE49-F238E27FC236}">
-                <a16:creationId xmlns:a16="http://schemas.microsoft.com/office/drawing/2014/main" id="{DD45BA7E-4D12-4F99-AFF0-A657D40ED34D}"/>
-              </a:ext>
-            </a:extLst>
-          </p:cNvPr>
-          <p:cNvPicPr>
-            <a:picLocks noChangeAspect="1"/>
-          </p:cNvPicPr>
-          <p:nvPr>
-            <p:custDataLst>
-              <p:tags r:id="rId1"/>
-            </p:custDataLst>
-          </p:nvPr>
-        </p:nvPicPr>
-        <p:blipFill>
-          <a:blip r:embed="rId9" cstate="print">
-            <a:extLst>
-              <a:ext uri="{28A0092B-C50C-407E-A947-70E740481C1C}">
-                <a14:useLocalDpi xmlns:a14="http://schemas.microsoft.com/office/drawing/2010/main" val="0"/>
-              </a:ext>
-            </a:extLst>
-          </a:blip>
-          <a:stretch>
-            <a:fillRect/>
-          </a:stretch>
-        </p:blipFill>
-        <p:spPr>
-          <a:xfrm>
-            <a:off x="4198737" y="1505207"/>
-            <a:ext cx="4219956" cy="651510"/>
-          </a:xfrm>
-          <a:prstGeom prst="rect">
-            <a:avLst/>
-          </a:prstGeom>
-        </p:spPr>
-      </p:pic>
-      <p:pic>
-        <p:nvPicPr>
-          <p:cNvPr id="6" name="Picture 5">
-            <a:extLst>
-              <a:ext uri="{FF2B5EF4-FFF2-40B4-BE49-F238E27FC236}">
-                <a16:creationId xmlns:a16="http://schemas.microsoft.com/office/drawing/2014/main" id="{5631D7CF-C600-4E58-988E-CDF9DF2C5E59}"/>
-              </a:ext>
-            </a:extLst>
-          </p:cNvPr>
-          <p:cNvPicPr>
-            <a:picLocks noChangeAspect="1"/>
-          </p:cNvPicPr>
-          <p:nvPr>
-            <p:custDataLst>
-              <p:tags r:id="rId2"/>
-            </p:custDataLst>
-          </p:nvPr>
-        </p:nvPicPr>
-        <p:blipFill>
-          <a:blip r:embed="rId10" cstate="print">
-            <a:extLst>
-              <a:ext uri="{28A0092B-C50C-407E-A947-70E740481C1C}">
-                <a14:useLocalDpi xmlns:a14="http://schemas.microsoft.com/office/drawing/2010/main" val="0"/>
-              </a:ext>
-            </a:extLst>
-          </a:blip>
-          <a:stretch>
-            <a:fillRect/>
-          </a:stretch>
-        </p:blipFill>
-        <p:spPr>
-          <a:xfrm>
-            <a:off x="1727887" y="2845184"/>
-            <a:ext cx="5298948" cy="445770"/>
-          </a:xfrm>
-          <a:prstGeom prst="rect">
-            <a:avLst/>
-          </a:prstGeom>
-        </p:spPr>
-      </p:pic>
-      <p:cxnSp>
-        <p:nvCxnSpPr>
-          <p:cNvPr id="7" name="Straight Connector 6">
-            <a:extLst>
-              <a:ext uri="{FF2B5EF4-FFF2-40B4-BE49-F238E27FC236}">
-                <a16:creationId xmlns:a16="http://schemas.microsoft.com/office/drawing/2014/main" id="{CBA34F74-CB2B-4012-BCC2-108B7C391AAF}"/>
-              </a:ext>
-            </a:extLst>
-          </p:cNvPr>
-          <p:cNvCxnSpPr/>
-          <p:nvPr/>
-        </p:nvCxnSpPr>
-        <p:spPr>
-          <a:xfrm flipV="1">
-            <a:off x="1956487" y="3514982"/>
-            <a:ext cx="0" cy="2168626"/>
-          </a:xfrm>
-          <a:prstGeom prst="line">
-            <a:avLst/>
-          </a:prstGeom>
-          <a:ln w="38100">
-            <a:solidFill>
-              <a:schemeClr val="tx1"/>
-            </a:solidFill>
-            <a:tailEnd type="arrow" w="lg" len="med"/>
-          </a:ln>
-        </p:spPr>
-        <p:style>
-          <a:lnRef idx="1">
-            <a:schemeClr val="accent1"/>
-          </a:lnRef>
-          <a:fillRef idx="0">
-            <a:schemeClr val="accent1"/>
-          </a:fillRef>
-          <a:effectRef idx="0">
-            <a:schemeClr val="accent1"/>
-          </a:effectRef>
-          <a:fontRef idx="minor">
-            <a:schemeClr val="tx1"/>
-          </a:fontRef>
-        </p:style>
-      </p:cxnSp>
-      <p:cxnSp>
-        <p:nvCxnSpPr>
-          <p:cNvPr id="8" name="Straight Connector 7">
-            <a:extLst>
-              <a:ext uri="{FF2B5EF4-FFF2-40B4-BE49-F238E27FC236}">
-                <a16:creationId xmlns:a16="http://schemas.microsoft.com/office/drawing/2014/main" id="{E64F6D11-16F7-4F26-82D1-C38629FAB668}"/>
-              </a:ext>
-            </a:extLst>
-          </p:cNvPr>
-          <p:cNvCxnSpPr/>
-          <p:nvPr/>
-        </p:nvCxnSpPr>
-        <p:spPr>
-          <a:xfrm>
-            <a:off x="1727887" y="5443223"/>
-            <a:ext cx="3200399" cy="0"/>
-          </a:xfrm>
-          <a:prstGeom prst="line">
-            <a:avLst/>
-          </a:prstGeom>
-          <a:ln w="38100">
-            <a:solidFill>
-              <a:schemeClr val="tx1"/>
-            </a:solidFill>
-            <a:tailEnd type="arrow" w="lg" len="med"/>
-          </a:ln>
-        </p:spPr>
-        <p:style>
-          <a:lnRef idx="1">
-            <a:schemeClr val="accent1"/>
-          </a:lnRef>
-          <a:fillRef idx="0">
-            <a:schemeClr val="accent1"/>
-          </a:fillRef>
-          <a:effectRef idx="0">
-            <a:schemeClr val="accent1"/>
-          </a:effectRef>
-          <a:fontRef idx="minor">
-            <a:schemeClr val="tx1"/>
-          </a:fontRef>
-        </p:style>
-      </p:cxnSp>
-      <p:pic>
-        <p:nvPicPr>
-          <p:cNvPr id="9" name="Picture 8">
-            <a:extLst>
-              <a:ext uri="{FF2B5EF4-FFF2-40B4-BE49-F238E27FC236}">
-                <a16:creationId xmlns:a16="http://schemas.microsoft.com/office/drawing/2014/main" id="{3541A9DE-0009-44AB-9B7D-EA6E0D5457F8}"/>
-              </a:ext>
-            </a:extLst>
-          </p:cNvPr>
-          <p:cNvPicPr>
-            <a:picLocks noChangeAspect="1"/>
-          </p:cNvPicPr>
-          <p:nvPr>
-            <p:custDataLst>
-              <p:tags r:id="rId3"/>
-            </p:custDataLst>
-          </p:nvPr>
-        </p:nvPicPr>
-        <p:blipFill>
-          <a:blip r:embed="rId11" cstate="print">
-            <a:extLst>
-              <a:ext uri="{28A0092B-C50C-407E-A947-70E740481C1C}">
-                <a14:useLocalDpi xmlns:a14="http://schemas.microsoft.com/office/drawing/2010/main" val="0"/>
-              </a:ext>
-            </a:extLst>
-          </a:blip>
-          <a:stretch>
-            <a:fillRect/>
-          </a:stretch>
-        </p:blipFill>
-        <p:spPr>
-          <a:xfrm>
-            <a:off x="3099487" y="5540378"/>
-            <a:ext cx="153619" cy="260604"/>
-          </a:xfrm>
-          <a:prstGeom prst="rect">
-            <a:avLst/>
-          </a:prstGeom>
-        </p:spPr>
-      </p:pic>
-      <p:pic>
-        <p:nvPicPr>
-          <p:cNvPr id="10" name="Picture 9">
-            <a:extLst>
-              <a:ext uri="{FF2B5EF4-FFF2-40B4-BE49-F238E27FC236}">
-                <a16:creationId xmlns:a16="http://schemas.microsoft.com/office/drawing/2014/main" id="{CB477269-F141-4330-83CF-24198F287346}"/>
-              </a:ext>
-            </a:extLst>
-          </p:cNvPr>
-          <p:cNvPicPr>
-            <a:picLocks noChangeAspect="1"/>
-          </p:cNvPicPr>
-          <p:nvPr>
-            <p:custDataLst>
-              <p:tags r:id="rId4"/>
-            </p:custDataLst>
-          </p:nvPr>
-        </p:nvPicPr>
-        <p:blipFill>
-          <a:blip r:embed="rId12" cstate="print">
-            <a:extLst>
-              <a:ext uri="{28A0092B-C50C-407E-A947-70E740481C1C}">
-                <a14:useLocalDpi xmlns:a14="http://schemas.microsoft.com/office/drawing/2010/main" val="0"/>
-              </a:ext>
-            </a:extLst>
-          </a:blip>
-          <a:stretch>
-            <a:fillRect/>
-          </a:stretch>
-        </p:blipFill>
-        <p:spPr>
-          <a:xfrm>
-            <a:off x="4500347" y="3743584"/>
-            <a:ext cx="427939" cy="245059"/>
-          </a:xfrm>
-          <a:prstGeom prst="rect">
-            <a:avLst/>
-          </a:prstGeom>
-        </p:spPr>
-      </p:pic>
-      <p:sp>
-        <p:nvSpPr>
-          <p:cNvPr id="11" name="TextBox 10">
-            <a:extLst>
-              <a:ext uri="{FF2B5EF4-FFF2-40B4-BE49-F238E27FC236}">
-                <a16:creationId xmlns:a16="http://schemas.microsoft.com/office/drawing/2014/main" id="{65EDA715-7B8C-41A9-9474-391AAE8B5CA0}"/>
-              </a:ext>
-            </a:extLst>
-          </p:cNvPr>
-          <p:cNvSpPr txBox="1"/>
-          <p:nvPr/>
-        </p:nvSpPr>
-        <p:spPr>
-          <a:xfrm>
-            <a:off x="2642287" y="3438782"/>
-            <a:ext cx="2110092" cy="369332"/>
-          </a:xfrm>
-          <a:prstGeom prst="rect">
-            <a:avLst/>
-          </a:prstGeom>
-          <a:noFill/>
-        </p:spPr>
-        <p:txBody>
-          <a:bodyPr wrap="square" rtlCol="0">
-            <a:spAutoFit/>
-          </a:bodyPr>
-          <a:lstStyle/>
-          <a:p>
-            <a:r>
-              <a:rPr lang="en-US" dirty="0"/>
-              <a:t>“non-convex”</a:t>
-            </a:r>
-          </a:p>
-        </p:txBody>
-      </p:sp>
-      <p:cxnSp>
-        <p:nvCxnSpPr>
-          <p:cNvPr id="12" name="Straight Connector 11">
-            <a:extLst>
-              <a:ext uri="{FF2B5EF4-FFF2-40B4-BE49-F238E27FC236}">
-                <a16:creationId xmlns:a16="http://schemas.microsoft.com/office/drawing/2014/main" id="{F9C01A05-6E62-452D-9FA8-7F911BFCB197}"/>
-              </a:ext>
-            </a:extLst>
-          </p:cNvPr>
-          <p:cNvCxnSpPr/>
-          <p:nvPr/>
-        </p:nvCxnSpPr>
-        <p:spPr>
-          <a:xfrm flipV="1">
-            <a:off x="6299887" y="3514982"/>
-            <a:ext cx="0" cy="2168626"/>
-          </a:xfrm>
-          <a:prstGeom prst="line">
-            <a:avLst/>
-          </a:prstGeom>
-          <a:ln w="38100">
-            <a:solidFill>
-              <a:schemeClr val="tx1"/>
-            </a:solidFill>
-            <a:tailEnd type="arrow" w="lg" len="med"/>
-          </a:ln>
-        </p:spPr>
-        <p:style>
-          <a:lnRef idx="1">
-            <a:schemeClr val="accent1"/>
-          </a:lnRef>
-          <a:fillRef idx="0">
-            <a:schemeClr val="accent1"/>
-          </a:fillRef>
-          <a:effectRef idx="0">
-            <a:schemeClr val="accent1"/>
-          </a:effectRef>
-          <a:fontRef idx="minor">
-            <a:schemeClr val="tx1"/>
-          </a:fontRef>
-        </p:style>
-      </p:cxnSp>
-      <p:cxnSp>
-        <p:nvCxnSpPr>
-          <p:cNvPr id="13" name="Straight Connector 12">
-            <a:extLst>
-              <a:ext uri="{FF2B5EF4-FFF2-40B4-BE49-F238E27FC236}">
-                <a16:creationId xmlns:a16="http://schemas.microsoft.com/office/drawing/2014/main" id="{BE69DD1C-89B8-4180-B634-285DDA2B20D7}"/>
-              </a:ext>
-            </a:extLst>
-          </p:cNvPr>
-          <p:cNvCxnSpPr/>
-          <p:nvPr/>
-        </p:nvCxnSpPr>
-        <p:spPr>
-          <a:xfrm>
-            <a:off x="6071287" y="5443223"/>
-            <a:ext cx="3200399" cy="0"/>
-          </a:xfrm>
-          <a:prstGeom prst="line">
-            <a:avLst/>
-          </a:prstGeom>
-          <a:ln w="38100">
-            <a:solidFill>
-              <a:schemeClr val="tx1"/>
-            </a:solidFill>
-            <a:tailEnd type="arrow" w="lg" len="med"/>
-          </a:ln>
-        </p:spPr>
-        <p:style>
-          <a:lnRef idx="1">
-            <a:schemeClr val="accent1"/>
-          </a:lnRef>
-          <a:fillRef idx="0">
-            <a:schemeClr val="accent1"/>
-          </a:fillRef>
-          <a:effectRef idx="0">
-            <a:schemeClr val="accent1"/>
-          </a:effectRef>
-          <a:fontRef idx="minor">
-            <a:schemeClr val="tx1"/>
-          </a:fontRef>
-        </p:style>
-      </p:cxnSp>
-      <p:pic>
-        <p:nvPicPr>
-          <p:cNvPr id="14" name="Picture 13">
-            <a:extLst>
-              <a:ext uri="{FF2B5EF4-FFF2-40B4-BE49-F238E27FC236}">
-                <a16:creationId xmlns:a16="http://schemas.microsoft.com/office/drawing/2014/main" id="{EFD9EDE8-8DA8-42BE-9284-6662443711DE}"/>
-              </a:ext>
-            </a:extLst>
-          </p:cNvPr>
-          <p:cNvPicPr>
-            <a:picLocks noChangeAspect="1"/>
-          </p:cNvPicPr>
-          <p:nvPr>
-            <p:custDataLst>
-              <p:tags r:id="rId5"/>
-            </p:custDataLst>
-          </p:nvPr>
-        </p:nvPicPr>
-        <p:blipFill>
-          <a:blip r:embed="rId11" cstate="print">
-            <a:extLst>
-              <a:ext uri="{28A0092B-C50C-407E-A947-70E740481C1C}">
-                <a14:useLocalDpi xmlns:a14="http://schemas.microsoft.com/office/drawing/2010/main" val="0"/>
-              </a:ext>
-            </a:extLst>
-          </a:blip>
-          <a:stretch>
-            <a:fillRect/>
-          </a:stretch>
-        </p:blipFill>
-        <p:spPr>
-          <a:xfrm>
-            <a:off x="7442887" y="5540378"/>
-            <a:ext cx="153619" cy="260604"/>
-          </a:xfrm>
-          <a:prstGeom prst="rect">
-            <a:avLst/>
-          </a:prstGeom>
-        </p:spPr>
-      </p:pic>
-      <p:pic>
-        <p:nvPicPr>
-          <p:cNvPr id="15" name="Picture 14">
-            <a:extLst>
-              <a:ext uri="{FF2B5EF4-FFF2-40B4-BE49-F238E27FC236}">
-                <a16:creationId xmlns:a16="http://schemas.microsoft.com/office/drawing/2014/main" id="{357E4570-A144-46FE-805C-414E8B117777}"/>
-              </a:ext>
-            </a:extLst>
-          </p:cNvPr>
-          <p:cNvPicPr>
-            <a:picLocks noChangeAspect="1"/>
-          </p:cNvPicPr>
-          <p:nvPr>
-            <p:custDataLst>
-              <p:tags r:id="rId6"/>
-            </p:custDataLst>
-          </p:nvPr>
-        </p:nvPicPr>
-        <p:blipFill>
-          <a:blip r:embed="rId12" cstate="print">
-            <a:extLst>
-              <a:ext uri="{28A0092B-C50C-407E-A947-70E740481C1C}">
-                <a14:useLocalDpi xmlns:a14="http://schemas.microsoft.com/office/drawing/2010/main" val="0"/>
-              </a:ext>
-            </a:extLst>
-          </a:blip>
-          <a:stretch>
-            <a:fillRect/>
-          </a:stretch>
-        </p:blipFill>
-        <p:spPr>
-          <a:xfrm>
-            <a:off x="8843747" y="3743584"/>
-            <a:ext cx="427939" cy="245059"/>
-          </a:xfrm>
-          <a:prstGeom prst="rect">
-            <a:avLst/>
-          </a:prstGeom>
-        </p:spPr>
-      </p:pic>
-      <p:sp>
-        <p:nvSpPr>
-          <p:cNvPr id="16" name="TextBox 15">
-            <a:extLst>
-              <a:ext uri="{FF2B5EF4-FFF2-40B4-BE49-F238E27FC236}">
-                <a16:creationId xmlns:a16="http://schemas.microsoft.com/office/drawing/2014/main" id="{1A084DBA-E752-4102-BFD7-903FCC36AB26}"/>
-              </a:ext>
-            </a:extLst>
-          </p:cNvPr>
-          <p:cNvSpPr txBox="1"/>
-          <p:nvPr/>
-        </p:nvSpPr>
-        <p:spPr>
-          <a:xfrm>
-            <a:off x="7138087" y="3438782"/>
-            <a:ext cx="1307275" cy="369332"/>
-          </a:xfrm>
-          <a:prstGeom prst="rect">
-            <a:avLst/>
-          </a:prstGeom>
-          <a:noFill/>
-        </p:spPr>
-        <p:txBody>
-          <a:bodyPr wrap="square" rtlCol="0">
-            <a:spAutoFit/>
-          </a:bodyPr>
-          <a:lstStyle/>
-          <a:p>
-            <a:r>
-              <a:rPr lang="en-US" dirty="0"/>
-              <a:t>“convex”</a:t>
-            </a:r>
-          </a:p>
-        </p:txBody>
-      </p:sp>
-      <p:pic>
-        <p:nvPicPr>
-          <p:cNvPr id="17" name="Picture 16">
-            <a:extLst>
-              <a:ext uri="{FF2B5EF4-FFF2-40B4-BE49-F238E27FC236}">
-                <a16:creationId xmlns:a16="http://schemas.microsoft.com/office/drawing/2014/main" id="{ECD5A160-5DBE-4827-BFDC-4B2DD23DACAD}"/>
-              </a:ext>
-            </a:extLst>
-          </p:cNvPr>
-          <p:cNvPicPr>
-            <a:picLocks noChangeAspect="1"/>
-          </p:cNvPicPr>
-          <p:nvPr>
-            <p:custDataLst>
-              <p:tags r:id="rId7"/>
-            </p:custDataLst>
-          </p:nvPr>
-        </p:nvPicPr>
-        <p:blipFill>
-          <a:blip r:embed="rId13" cstate="print">
-            <a:extLst>
-              <a:ext uri="{28A0092B-C50C-407E-A947-70E740481C1C}">
-                <a14:useLocalDpi xmlns:a14="http://schemas.microsoft.com/office/drawing/2010/main" val="0"/>
-              </a:ext>
-            </a:extLst>
-          </a:blip>
-          <a:stretch>
-            <a:fillRect/>
-          </a:stretch>
-        </p:blipFill>
-        <p:spPr>
-          <a:xfrm>
-            <a:off x="8418576" y="2138712"/>
-            <a:ext cx="2935224" cy="781812"/>
-          </a:xfrm>
-          <a:prstGeom prst="rect">
-            <a:avLst/>
-          </a:prstGeom>
-        </p:spPr>
-      </p:pic>
-    </p:spTree>
-    <p:extLst>
-      <p:ext uri="{BB962C8B-B14F-4D97-AF65-F5344CB8AC3E}">
-        <p14:creationId xmlns:p14="http://schemas.microsoft.com/office/powerpoint/2010/main" val="2717011964"/>
-      </p:ext>
-    </p:extLst>
-  </p:cSld>
-  <p:clrMapOvr>
-    <a:masterClrMapping/>
-  </p:clrMapOvr>
-  <p:timing>
-    <p:tnLst>
-      <p:par>
-        <p:cTn id="1" dur="indefinite" restart="never" nodeType="tmRoot">
-          <p:childTnLst>
-            <p:seq concurrent="1" nextAc="seek">
-              <p:cTn id="2" dur="indefinite" nodeType="mainSeq">
-                <p:childTnLst>
-                  <p:par>
-                    <p:cTn id="3" fill="hold">
-                      <p:stCondLst>
-                        <p:cond delay="indefinite"/>
-                      </p:stCondLst>
-                      <p:childTnLst>
-                        <p:par>
-                          <p:cTn id="4" fill="hold">
-                            <p:stCondLst>
-                              <p:cond delay="0"/>
-                            </p:stCondLst>
-                            <p:childTnLst>
-                              <p:par>
-                                <p:cTn id="5" presetID="1" presetClass="entr" presetSubtype="0" fill="hold" nodeType="clickEffect">
-                                  <p:stCondLst>
-                                    <p:cond delay="0"/>
-                                  </p:stCondLst>
-                                  <p:childTnLst>
-                                    <p:set>
-                                      <p:cBhvr>
-                                        <p:cTn id="6" dur="1" fill="hold">
-                                          <p:stCondLst>
-                                            <p:cond delay="0"/>
-                                          </p:stCondLst>
-                                        </p:cTn>
-                                        <p:tgtEl>
-                                          <p:spTgt spid="6"/>
-                                        </p:tgtEl>
-                                        <p:attrNameLst>
-                                          <p:attrName>style.visibility</p:attrName>
-                                        </p:attrNameLst>
-                                      </p:cBhvr>
-                                      <p:to>
-                                        <p:strVal val="visible"/>
-                                      </p:to>
-                                    </p:set>
-                                  </p:childTnLst>
-                                </p:cTn>
-                              </p:par>
-                            </p:childTnLst>
-                          </p:cTn>
-                        </p:par>
-                      </p:childTnLst>
-                    </p:cTn>
-                  </p:par>
-                  <p:par>
-                    <p:cTn id="7" fill="hold">
-                      <p:stCondLst>
-                        <p:cond delay="indefinite"/>
-                      </p:stCondLst>
-                      <p:childTnLst>
-                        <p:par>
-                          <p:cTn id="8" fill="hold">
-                            <p:stCondLst>
-                              <p:cond delay="0"/>
-                            </p:stCondLst>
-                            <p:childTnLst>
-                              <p:par>
-                                <p:cTn id="9" presetID="1" presetClass="entr" presetSubtype="0" fill="hold" nodeType="clickEffect">
-                                  <p:stCondLst>
-                                    <p:cond delay="0"/>
-                                  </p:stCondLst>
-                                  <p:childTnLst>
-                                    <p:set>
-                                      <p:cBhvr>
-                                        <p:cTn id="10" dur="1" fill="hold">
-                                          <p:stCondLst>
-                                            <p:cond delay="0"/>
-                                          </p:stCondLst>
-                                        </p:cTn>
-                                        <p:tgtEl>
-                                          <p:spTgt spid="7"/>
-                                        </p:tgtEl>
-                                        <p:attrNameLst>
-                                          <p:attrName>style.visibility</p:attrName>
-                                        </p:attrNameLst>
-                                      </p:cBhvr>
-                                      <p:to>
-                                        <p:strVal val="visible"/>
-                                      </p:to>
-                                    </p:set>
-                                  </p:childTnLst>
-                                </p:cTn>
-                              </p:par>
-                              <p:par>
-                                <p:cTn id="11" presetID="1" presetClass="entr" presetSubtype="0" fill="hold" nodeType="withEffect">
-                                  <p:stCondLst>
-                                    <p:cond delay="0"/>
-                                  </p:stCondLst>
-                                  <p:childTnLst>
-                                    <p:set>
-                                      <p:cBhvr>
-                                        <p:cTn id="12" dur="1" fill="hold">
-                                          <p:stCondLst>
-                                            <p:cond delay="0"/>
-                                          </p:stCondLst>
-                                        </p:cTn>
-                                        <p:tgtEl>
-                                          <p:spTgt spid="8"/>
-                                        </p:tgtEl>
-                                        <p:attrNameLst>
-                                          <p:attrName>style.visibility</p:attrName>
-                                        </p:attrNameLst>
-                                      </p:cBhvr>
-                                      <p:to>
-                                        <p:strVal val="visible"/>
-                                      </p:to>
-                                    </p:set>
-                                  </p:childTnLst>
-                                </p:cTn>
-                              </p:par>
-                              <p:par>
-                                <p:cTn id="13" presetID="1" presetClass="entr" presetSubtype="0" fill="hold" nodeType="withEffect">
-                                  <p:stCondLst>
-                                    <p:cond delay="0"/>
-                                  </p:stCondLst>
-                                  <p:childTnLst>
-                                    <p:set>
-                                      <p:cBhvr>
-                                        <p:cTn id="14" dur="1" fill="hold">
-                                          <p:stCondLst>
-                                            <p:cond delay="0"/>
-                                          </p:stCondLst>
-                                        </p:cTn>
-                                        <p:tgtEl>
-                                          <p:spTgt spid="9"/>
-                                        </p:tgtEl>
-                                        <p:attrNameLst>
-                                          <p:attrName>style.visibility</p:attrName>
-                                        </p:attrNameLst>
-                                      </p:cBhvr>
-                                      <p:to>
-                                        <p:strVal val="visible"/>
-                                      </p:to>
-                                    </p:set>
-                                  </p:childTnLst>
-                                </p:cTn>
-                              </p:par>
-                              <p:par>
-                                <p:cTn id="15" presetID="1" presetClass="entr" presetSubtype="0" fill="hold" nodeType="withEffect">
-                                  <p:stCondLst>
-                                    <p:cond delay="0"/>
-                                  </p:stCondLst>
-                                  <p:childTnLst>
-                                    <p:set>
-                                      <p:cBhvr>
-                                        <p:cTn id="16" dur="1" fill="hold">
-                                          <p:stCondLst>
-                                            <p:cond delay="0"/>
-                                          </p:stCondLst>
-                                        </p:cTn>
-                                        <p:tgtEl>
-                                          <p:spTgt spid="10"/>
-                                        </p:tgtEl>
-                                        <p:attrNameLst>
-                                          <p:attrName>style.visibility</p:attrName>
-                                        </p:attrNameLst>
-                                      </p:cBhvr>
-                                      <p:to>
-                                        <p:strVal val="visible"/>
-                                      </p:to>
-                                    </p:set>
-                                  </p:childTnLst>
-                                </p:cTn>
-                              </p:par>
-                              <p:par>
-                                <p:cTn id="17" presetID="1" presetClass="entr" presetSubtype="0" fill="hold" grpId="0" nodeType="withEffect">
-                                  <p:stCondLst>
-                                    <p:cond delay="0"/>
-                                  </p:stCondLst>
-                                  <p:childTnLst>
-                                    <p:set>
-                                      <p:cBhvr>
-                                        <p:cTn id="18" dur="1" fill="hold">
-                                          <p:stCondLst>
-                                            <p:cond delay="0"/>
-                                          </p:stCondLst>
-                                        </p:cTn>
-                                        <p:tgtEl>
-                                          <p:spTgt spid="11"/>
-                                        </p:tgtEl>
-                                        <p:attrNameLst>
-                                          <p:attrName>style.visibility</p:attrName>
-                                        </p:attrNameLst>
-                                      </p:cBhvr>
-                                      <p:to>
-                                        <p:strVal val="visible"/>
-                                      </p:to>
-                                    </p:set>
-                                  </p:childTnLst>
-                                </p:cTn>
-                              </p:par>
-                              <p:par>
-                                <p:cTn id="19" presetID="1" presetClass="entr" presetSubtype="0" fill="hold" nodeType="withEffect">
-                                  <p:stCondLst>
-                                    <p:cond delay="0"/>
-                                  </p:stCondLst>
-                                  <p:childTnLst>
-                                    <p:set>
-                                      <p:cBhvr>
-                                        <p:cTn id="20" dur="1" fill="hold">
-                                          <p:stCondLst>
-                                            <p:cond delay="0"/>
-                                          </p:stCondLst>
-                                        </p:cTn>
-                                        <p:tgtEl>
-                                          <p:spTgt spid="12"/>
-                                        </p:tgtEl>
-                                        <p:attrNameLst>
-                                          <p:attrName>style.visibility</p:attrName>
-                                        </p:attrNameLst>
-                                      </p:cBhvr>
-                                      <p:to>
-                                        <p:strVal val="visible"/>
-                                      </p:to>
-                                    </p:set>
-                                  </p:childTnLst>
-                                </p:cTn>
-                              </p:par>
-                              <p:par>
-                                <p:cTn id="21" presetID="1" presetClass="entr" presetSubtype="0" fill="hold" nodeType="withEffect">
-                                  <p:stCondLst>
-                                    <p:cond delay="0"/>
-                                  </p:stCondLst>
-                                  <p:childTnLst>
-                                    <p:set>
-                                      <p:cBhvr>
-                                        <p:cTn id="22" dur="1" fill="hold">
-                                          <p:stCondLst>
-                                            <p:cond delay="0"/>
-                                          </p:stCondLst>
-                                        </p:cTn>
-                                        <p:tgtEl>
-                                          <p:spTgt spid="13"/>
-                                        </p:tgtEl>
-                                        <p:attrNameLst>
-                                          <p:attrName>style.visibility</p:attrName>
-                                        </p:attrNameLst>
-                                      </p:cBhvr>
-                                      <p:to>
-                                        <p:strVal val="visible"/>
-                                      </p:to>
-                                    </p:set>
-                                  </p:childTnLst>
-                                </p:cTn>
-                              </p:par>
-                              <p:par>
-                                <p:cTn id="23" presetID="1" presetClass="entr" presetSubtype="0" fill="hold" nodeType="withEffect">
-                                  <p:stCondLst>
-                                    <p:cond delay="0"/>
-                                  </p:stCondLst>
-                                  <p:childTnLst>
-                                    <p:set>
-                                      <p:cBhvr>
-                                        <p:cTn id="24" dur="1" fill="hold">
-                                          <p:stCondLst>
-                                            <p:cond delay="0"/>
-                                          </p:stCondLst>
-                                        </p:cTn>
-                                        <p:tgtEl>
-                                          <p:spTgt spid="14"/>
-                                        </p:tgtEl>
-                                        <p:attrNameLst>
-                                          <p:attrName>style.visibility</p:attrName>
-                                        </p:attrNameLst>
-                                      </p:cBhvr>
-                                      <p:to>
-                                        <p:strVal val="visible"/>
-                                      </p:to>
-                                    </p:set>
-                                  </p:childTnLst>
-                                </p:cTn>
-                              </p:par>
-                              <p:par>
-                                <p:cTn id="25" presetID="1" presetClass="entr" presetSubtype="0" fill="hold" nodeType="withEffect">
-                                  <p:stCondLst>
-                                    <p:cond delay="0"/>
-                                  </p:stCondLst>
-                                  <p:childTnLst>
-                                    <p:set>
-                                      <p:cBhvr>
-                                        <p:cTn id="26" dur="1" fill="hold">
-                                          <p:stCondLst>
-                                            <p:cond delay="0"/>
-                                          </p:stCondLst>
-                                        </p:cTn>
-                                        <p:tgtEl>
-                                          <p:spTgt spid="15"/>
-                                        </p:tgtEl>
-                                        <p:attrNameLst>
-                                          <p:attrName>style.visibility</p:attrName>
-                                        </p:attrNameLst>
-                                      </p:cBhvr>
-                                      <p:to>
-                                        <p:strVal val="visible"/>
-                                      </p:to>
-                                    </p:set>
-                                  </p:childTnLst>
-                                </p:cTn>
-                              </p:par>
-                              <p:par>
-                                <p:cTn id="27" presetID="1" presetClass="entr" presetSubtype="0" fill="hold" grpId="0" nodeType="withEffect">
-                                  <p:stCondLst>
-                                    <p:cond delay="0"/>
-                                  </p:stCondLst>
-                                  <p:childTnLst>
-                                    <p:set>
-                                      <p:cBhvr>
-                                        <p:cTn id="28" dur="1" fill="hold">
-                                          <p:stCondLst>
-                                            <p:cond delay="0"/>
-                                          </p:stCondLst>
-                                        </p:cTn>
-                                        <p:tgtEl>
-                                          <p:spTgt spid="16"/>
-                                        </p:tgtEl>
-                                        <p:attrNameLst>
-                                          <p:attrName>style.visibility</p:attrName>
-                                        </p:attrNameLst>
-                                      </p:cBhvr>
-                                      <p:to>
-                                        <p:strVal val="visible"/>
-                                      </p:to>
-                                    </p:set>
-                                  </p:childTnLst>
-                                </p:cTn>
-                              </p:par>
-                            </p:childTnLst>
-                          </p:cTn>
-                        </p:par>
-                      </p:childTnLst>
-                    </p:cTn>
-                  </p:par>
-                </p:childTnLst>
-              </p:cTn>
-              <p:prevCondLst>
-                <p:cond evt="onPrev" delay="0">
-                  <p:tgtEl>
-                    <p:sldTgt/>
-                  </p:tgtEl>
-                </p:cond>
-              </p:prevCondLst>
-              <p:nextCondLst>
-                <p:cond evt="onNext" delay="0">
-                  <p:tgtEl>
-                    <p:sldTgt/>
-                  </p:tgtEl>
-                </p:cond>
-              </p:nextCondLst>
-            </p:seq>
-          </p:childTnLst>
-        </p:cTn>
-      </p:par>
-    </p:tnLst>
-    <p:bldLst>
-      <p:bldP spid="11" grpId="0"/>
-      <p:bldP spid="16" grpId="0"/>
-    </p:bldLst>
-  </p:timing>
-</p:sld>
-</file>
-
-<file path=ppt/slides/slide6.xml><?xml version="1.0" encoding="utf-8"?>
 <p:sld xmlns:a="http://schemas.openxmlformats.org/drawingml/2006/main" xmlns:r="http://schemas.openxmlformats.org/officeDocument/2006/relationships" xmlns:p="http://schemas.openxmlformats.org/presentationml/2006/main">
   <p:cSld>
     <p:spTree>
@@ -7610,7 +6638,7 @@
 </p:sld>
 </file>
 
-<file path=ppt/slides/slide7.xml><?xml version="1.0" encoding="utf-8"?>
+<file path=ppt/slides/slide6.xml><?xml version="1.0" encoding="utf-8"?>
 <p:sld xmlns:a="http://schemas.openxmlformats.org/drawingml/2006/main" xmlns:r="http://schemas.openxmlformats.org/officeDocument/2006/relationships" xmlns:p="http://schemas.openxmlformats.org/presentationml/2006/main">
   <p:cSld>
     <p:spTree>
@@ -8358,7 +7386,7 @@
 </p:sld>
 </file>
 
-<file path=ppt/slides/slide8.xml><?xml version="1.0" encoding="utf-8"?>
+<file path=ppt/slides/slide7.xml><?xml version="1.0" encoding="utf-8"?>
 <p:sld xmlns:a="http://schemas.openxmlformats.org/drawingml/2006/main" xmlns:r="http://schemas.openxmlformats.org/officeDocument/2006/relationships" xmlns:p="http://schemas.openxmlformats.org/presentationml/2006/main">
   <p:cSld>
     <p:spTree>
@@ -8455,7 +7483,7 @@
 </p:sld>
 </file>
 
-<file path=ppt/slides/slide9.xml><?xml version="1.0" encoding="utf-8"?>
+<file path=ppt/slides/slide8.xml><?xml version="1.0" encoding="utf-8"?>
 <p:sld xmlns:a="http://schemas.openxmlformats.org/drawingml/2006/main" xmlns:r="http://schemas.openxmlformats.org/officeDocument/2006/relationships" xmlns:p="http://schemas.openxmlformats.org/presentationml/2006/main">
   <p:cSld>
     <p:spTree>
@@ -8929,70 +7957,49 @@
 
 <file path=ppt/tags/tag10.xml><?xml version="1.0" encoding="utf-8"?>
 <p:tagLst xmlns:a="http://schemas.openxmlformats.org/drawingml/2006/main" xmlns:r="http://schemas.openxmlformats.org/officeDocument/2006/relationships" xmlns:p="http://schemas.openxmlformats.org/presentationml/2006/main">
-  <p:tag name="LATEXADDIN" val="\documentclass{article}&#10;\usepackage{amsmath}&#10;\pagestyle{empty}&#10;\begin{document}&#10;&#10;&#10;$ \displaystyle&#10;\theta&#10;$&#10;&#10;\end{document}"/>
-  <p:tag name="IGUANATEXSIZE" val="36"/>
+  <p:tag name="LATEXADDIN" val="\documentclass{article}&#10;\usepackage{amsmath}&#10;\usepackage{color}&#10;\pagestyle{empty}&#10;\begin{document}&#10;&#10;$&#10;\mathrm{Cost}(h_\theta(x),y) = &#10;\left\{ \begin{array}{rl}&#10;- \mathrm{log}(h_\theta(x)) &amp;\mbox{if $y = 1$} \\&#10;- \mathrm{log}(1-h_\theta(x)) &amp;\mbox{if $y = 0$} &#10;\end{array} \right.&#10;$&#10;% \delta_i^{(l)} = \left(\sum_j W_{ji}^{(l)} \delta_j^{(l+1)}\right) f'(z_i^{(l)})&#10;&#10;&#10;&#10;\end{document}"/>
+  <p:tag name="IGUANATEXSIZE" val="24"/>
 </p:tagLst>
 </file>
 
 <file path=ppt/tags/tag11.xml><?xml version="1.0" encoding="utf-8"?>
 <p:tagLst xmlns:a="http://schemas.openxmlformats.org/drawingml/2006/main" xmlns:r="http://schemas.openxmlformats.org/officeDocument/2006/relationships" xmlns:p="http://schemas.openxmlformats.org/presentationml/2006/main">
-  <p:tag name="LATEXADDIN" val="\documentclass{article}&#10;\usepackage{amsmath}&#10;\pagestyle{empty}&#10;\begin{document}&#10;&#10;&#10;$ \displaystyle&#10;J(\theta)&#10;$&#10;&#10;\end{document}"/>
+  <p:tag name="LATEXADDIN" val="\documentclass{article}&#10;\usepackage{amsmath}&#10;\usepackage{color}&#10;\pagestyle{empty}&#10;\begin{document}&#10;&#10;$&#10; = -\frac{1}{m}[ \sum\limits^{m}_{i=1} y^{(i)} \log {h_\theta(x^{(i)})}+ (1-y^{(i)}) \log {(1 - h_\theta(x^{(i)})})]&#10;$&#10;% \delta_i^{(l)} = \left(\sum_j W_{ji}^{(l)} \delta_j^{(l+1)}\right) f'(z_i^{(l)})&#10;&#10;&#10;&#10;\end{document}"/>
   <p:tag name="IGUANATEXSIZE" val="24"/>
 </p:tagLst>
 </file>
 
 <file path=ppt/tags/tag12.xml><?xml version="1.0" encoding="utf-8"?>
 <p:tagLst xmlns:a="http://schemas.openxmlformats.org/drawingml/2006/main" xmlns:r="http://schemas.openxmlformats.org/officeDocument/2006/relationships" xmlns:p="http://schemas.openxmlformats.org/presentationml/2006/main">
-  <p:tag name="LATEXADDIN" val="\documentclass{article}&#10;\usepackage{amsmath}&#10;\pagestyle{empty}&#10;\begin{document}&#10;&#10;&#10;$ \displaystyle&#10;h_\theta(x) = \frac{1}{1+e^{-\theta^Tx}}&#10;$&#10;&#10;\end{document}"/>
-  <p:tag name="IGUANATEXSIZE" val="36"/>
+  <p:tag name="LATEXADDIN" val="\documentclass{article}&#10;\usepackage{amsmath}&#10;\usepackage{color}&#10;\pagestyle{empty}&#10;\begin{document}&#10;&#10;$&#10;J(\theta) = \frac{1}{m} \sum\limits^{m}_{i=1} \mathrm{Cost}(h_\theta(x^{(i)}),y^{(i)}) &#10;$&#10;% \delta_i^{(l)} = \left(\sum_j W_{ji}^{(l)} \delta_j^{(l+1)}\right) f'(z_i^{(l)})&#10;&#10;&#10;&#10;\end{document}"/>
+  <p:tag name="IGUANATEXSIZE" val="24"/>
 </p:tagLst>
 </file>
 
 <file path=ppt/tags/tag13.xml><?xml version="1.0" encoding="utf-8"?>
 <p:tagLst xmlns:a="http://schemas.openxmlformats.org/drawingml/2006/main" xmlns:r="http://schemas.openxmlformats.org/officeDocument/2006/relationships" xmlns:p="http://schemas.openxmlformats.org/presentationml/2006/main">
-  <p:tag name="LATEXADDIN" val="\documentclass{article}&#10;\usepackage{amsmath}&#10;\usepackage{color}&#10;\pagestyle{empty}&#10;\begin{document}&#10;&#10;$&#10;\mathrm{Cost}(h_\theta(x),y) = &#10;\left\{ \begin{array}{rl}&#10;- \mathrm{log}(h_\theta(x)) &amp;\mbox{if $y = 1$} \\&#10;- \mathrm{log}(1-h_\theta(x)) &amp;\mbox{if $y = 0$} &#10;\end{array} \right.&#10;$&#10;% \delta_i^{(l)} = \left(\sum_j W_{ji}^{(l)} \delta_j^{(l+1)}\right) f'(z_i^{(l)})&#10;&#10;&#10;&#10;\end{document}"/>
+  <p:tag name="LATEXADDIN" val="\documentclass{article}&#10;\usepackage{amsmath}&#10;\usepackage{color}&#10;\pagestyle{empty}&#10;\begin{document}&#10;&#10;$&#10;\theta&#10;$&#10;&#10;&#10;&#10;\end{document}"/>
   <p:tag name="IGUANATEXSIZE" val="24"/>
 </p:tagLst>
 </file>
 
 <file path=ppt/tags/tag14.xml><?xml version="1.0" encoding="utf-8"?>
 <p:tagLst xmlns:a="http://schemas.openxmlformats.org/drawingml/2006/main" xmlns:r="http://schemas.openxmlformats.org/officeDocument/2006/relationships" xmlns:p="http://schemas.openxmlformats.org/presentationml/2006/main">
-  <p:tag name="LATEXADDIN" val="\documentclass{article}&#10;\usepackage{amsmath}&#10;\pagestyle{empty}&#10;\begin{document}&#10;&#10;Cost = 0 if &#10;$ \displaystyle&#10;y = 1, h_\theta(x) = 1&#10;$&#10;&#10;\begin{tabular}{ll}&#10;But as &amp; &#10;$ \displaystyle&#10;h_\theta(x) \rightarrow 0&#10;$&#10;\\&#10;&amp;&#10;$ \displaystyle&#10;Cost \rightarrow \infty&#10;$&#10;\end{tabular}&#10;&#10;\hspace{3mm}&#10;&#10;Captures intuition that if $h_\theta(x) = 0$,&#10;&#10;(predict $P(y=1|x;\theta) = 0)$, but $y=1$, &#10;&#10;we'll penalize learning algorithm by a very &#10;&#10;large cost.&#10;&#10;\end{document}"/>
-  <p:tag name="IGUANATEXSIZE" val="20"/>
+  <p:tag name="LATEXADDIN" val="\documentclass{article}&#10;\usepackage{amsmath}&#10;\usepackage{color}&#10;\pagestyle{empty}&#10;\begin{document}&#10;&#10;\[&#10;\min_\theta J(\theta)&#10;\]&#10;&#10;&#10;&#10;\end{document}"/>
+  <p:tag name="IGUANATEXSIZE" val="24"/>
 </p:tagLst>
 </file>
 
 <file path=ppt/tags/tag15.xml><?xml version="1.0" encoding="utf-8"?>
 <p:tagLst xmlns:a="http://schemas.openxmlformats.org/drawingml/2006/main" xmlns:r="http://schemas.openxmlformats.org/officeDocument/2006/relationships" xmlns:p="http://schemas.openxmlformats.org/presentationml/2006/main">
-  <p:tag name="LATEXADDIN" val="\documentclass{article}&#10;\usepackage{amsmath}&#10;\pagestyle{empty}&#10;\begin{document}&#10;&#10;&#10;$ \displaystyle&#10;h_\theta(x)&#10;$&#10;&#10;\end{document}"/>
-  <p:tag name="IGUANATEXSIZE" val="36"/>
+  <p:tag name="LATEXADDIN" val="\documentclass{article}&#10;\usepackage{amsmath}&#10;\usepackage{color}&#10;\pagestyle{empty}&#10;\begin{document}&#10;&#10;$&#10;x&#10;$&#10;&#10;&#10;&#10;\end{document}"/>
+  <p:tag name="IGUANATEXSIZE" val="24"/>
 </p:tagLst>
 </file>
 
 <file path=ppt/tags/tag16.xml><?xml version="1.0" encoding="utf-8"?>
 <p:tagLst xmlns:a="http://schemas.openxmlformats.org/drawingml/2006/main" xmlns:r="http://schemas.openxmlformats.org/officeDocument/2006/relationships" xmlns:p="http://schemas.openxmlformats.org/presentationml/2006/main">
-  <p:tag name="LATEXADDIN" val="\documentclass{article}&#10;\usepackage{amsmath}&#10;\pagestyle{empty}&#10;\begin{document}&#10;&#10;&#10;$ \displaystyle&#10;h_\theta(x)&#10;$&#10;&#10;\end{document}"/>
-  <p:tag name="IGUANATEXSIZE" val="36"/>
-</p:tagLst>
-</file>
-
-<file path=ppt/tags/tag17.xml><?xml version="1.0" encoding="utf-8"?>
-<p:tagLst xmlns:a="http://schemas.openxmlformats.org/drawingml/2006/main" xmlns:r="http://schemas.openxmlformats.org/officeDocument/2006/relationships" xmlns:p="http://schemas.openxmlformats.org/presentationml/2006/main">
-  <p:tag name="LATEXADDIN" val="\documentclass{article}&#10;\usepackage{amsmath}&#10;\usepackage{color}&#10;\pagestyle{empty}&#10;\begin{document}&#10;&#10;$&#10;\mathrm{Cost}(h_\theta(x),y) = &#10;\left\{ \begin{array}{rl}&#10;- \mathrm{log}(h_\theta(x)) &amp;\mbox{if $y = 1$} \\&#10;- \mathrm{log}(1-h_\theta(x)) &amp;\mbox{if $y = 0$} &#10;\end{array} \right.&#10;$&#10;% \delta_i^{(l)} = \left(\sum_j W_{ji}^{(l)} \delta_j^{(l+1)}\right) f'(z_i^{(l)})&#10;&#10;&#10;&#10;\end{document}"/>
-  <p:tag name="IGUANATEXSIZE" val="24"/>
-</p:tagLst>
-</file>
-
-<file path=ppt/tags/tag18.xml><?xml version="1.0" encoding="utf-8"?>
-<p:tagLst xmlns:a="http://schemas.openxmlformats.org/drawingml/2006/main" xmlns:r="http://schemas.openxmlformats.org/officeDocument/2006/relationships" xmlns:p="http://schemas.openxmlformats.org/presentationml/2006/main">
-  <p:tag name="LATEXADDIN" val="\documentclass{article}&#10;\usepackage{amsmath}&#10;\usepackage{color}&#10;\pagestyle{empty}&#10;\begin{document}&#10;&#10;$&#10; = -\frac{1}{m}[ \sum\limits^{m}_{i=1} y^{(i)} \log {h_\theta(x^{(i)})}+ (1-y^{(i)}) \log {(1 - h_\theta(x^{(i)})})]&#10;$&#10;% \delta_i^{(l)} = \left(\sum_j W_{ji}^{(l)} \delta_j^{(l+1)}\right) f'(z_i^{(l)})&#10;&#10;&#10;&#10;\end{document}"/>
-  <p:tag name="IGUANATEXSIZE" val="24"/>
-</p:tagLst>
-</file>
-
-<file path=ppt/tags/tag19.xml><?xml version="1.0" encoding="utf-8"?>
-<p:tagLst xmlns:a="http://schemas.openxmlformats.org/drawingml/2006/main" xmlns:r="http://schemas.openxmlformats.org/officeDocument/2006/relationships" xmlns:p="http://schemas.openxmlformats.org/presentationml/2006/main">
-  <p:tag name="LATEXADDIN" val="\documentclass{article}&#10;\usepackage{amsmath}&#10;\usepackage{color}&#10;\pagestyle{empty}&#10;\begin{document}&#10;&#10;$&#10;J(\theta) = \frac{1}{m} \sum\limits^{m}_{i=1} \mathrm{Cost}(h_\theta(x^{(i)}),y^{(i)}) &#10;$&#10;% \delta_i^{(l)} = \left(\sum_j W_{ji}^{(l)} \delta_j^{(l+1)}\right) f'(z_i^{(l)})&#10;&#10;&#10;&#10;\end{document}"/>
+  <p:tag name="LATEXADDIN" val="\documentclass{article}&#10;\usepackage{amsmath}&#10;\usepackage{color}&#10;\pagestyle{empty}&#10;\begin{document}&#10;&#10;$&#10;h_\theta(x) = \frac{1}{1 + e^{- \theta^Tx}}&#10;$&#10;&#10;&#10;&#10;\end{document}"/>
   <p:tag name="IGUANATEXSIZE" val="24"/>
 </p:tagLst>
 </file>
@@ -9001,34 +8008,6 @@
 <p:tagLst xmlns:a="http://schemas.openxmlformats.org/drawingml/2006/main" xmlns:r="http://schemas.openxmlformats.org/officeDocument/2006/relationships" xmlns:p="http://schemas.openxmlformats.org/presentationml/2006/main">
   <p:tag name="LATEXADDIN" val="\documentclass{article}&#10;\usepackage{amsmath}&#10;\pagestyle{empty}&#10;\begin{document}&#10;&#10;&#10;$ &#10;\displaystyle&#10;x \in \left[ &#10;\begin{array}{c}&#10;x_0 \\&#10;x_1 \\&#10;\cdots \\&#10;x_n&#10;\end{array}&#10;\right]&#10;$&#10;&#10;&#10;\end{document}"/>
   <p:tag name="IGUANATEXSIZE" val="30"/>
-</p:tagLst>
-</file>
-
-<file path=ppt/tags/tag20.xml><?xml version="1.0" encoding="utf-8"?>
-<p:tagLst xmlns:a="http://schemas.openxmlformats.org/drawingml/2006/main" xmlns:r="http://schemas.openxmlformats.org/officeDocument/2006/relationships" xmlns:p="http://schemas.openxmlformats.org/presentationml/2006/main">
-  <p:tag name="LATEXADDIN" val="\documentclass{article}&#10;\usepackage{amsmath}&#10;\usepackage{color}&#10;\pagestyle{empty}&#10;\begin{document}&#10;&#10;$&#10;\theta&#10;$&#10;&#10;&#10;&#10;\end{document}"/>
-  <p:tag name="IGUANATEXSIZE" val="24"/>
-</p:tagLst>
-</file>
-
-<file path=ppt/tags/tag21.xml><?xml version="1.0" encoding="utf-8"?>
-<p:tagLst xmlns:a="http://schemas.openxmlformats.org/drawingml/2006/main" xmlns:r="http://schemas.openxmlformats.org/officeDocument/2006/relationships" xmlns:p="http://schemas.openxmlformats.org/presentationml/2006/main">
-  <p:tag name="LATEXADDIN" val="\documentclass{article}&#10;\usepackage{amsmath}&#10;\usepackage{color}&#10;\pagestyle{empty}&#10;\begin{document}&#10;&#10;\[&#10;\min_\theta J(\theta)&#10;\]&#10;&#10;&#10;&#10;\end{document}"/>
-  <p:tag name="IGUANATEXSIZE" val="24"/>
-</p:tagLst>
-</file>
-
-<file path=ppt/tags/tag22.xml><?xml version="1.0" encoding="utf-8"?>
-<p:tagLst xmlns:a="http://schemas.openxmlformats.org/drawingml/2006/main" xmlns:r="http://schemas.openxmlformats.org/officeDocument/2006/relationships" xmlns:p="http://schemas.openxmlformats.org/presentationml/2006/main">
-  <p:tag name="LATEXADDIN" val="\documentclass{article}&#10;\usepackage{amsmath}&#10;\usepackage{color}&#10;\pagestyle{empty}&#10;\begin{document}&#10;&#10;$&#10;x&#10;$&#10;&#10;&#10;&#10;\end{document}"/>
-  <p:tag name="IGUANATEXSIZE" val="24"/>
-</p:tagLst>
-</file>
-
-<file path=ppt/tags/tag23.xml><?xml version="1.0" encoding="utf-8"?>
-<p:tagLst xmlns:a="http://schemas.openxmlformats.org/drawingml/2006/main" xmlns:r="http://schemas.openxmlformats.org/officeDocument/2006/relationships" xmlns:p="http://schemas.openxmlformats.org/presentationml/2006/main">
-  <p:tag name="LATEXADDIN" val="\documentclass{article}&#10;\usepackage{amsmath}&#10;\usepackage{color}&#10;\pagestyle{empty}&#10;\begin{document}&#10;&#10;$&#10;h_\theta(x) = \frac{1}{1 + e^{- \theta^Tx}}&#10;$&#10;&#10;&#10;&#10;\end{document}"/>
-  <p:tag name="IGUANATEXSIZE" val="24"/>
 </p:tagLst>
 </file>
 
@@ -9055,29 +8034,29 @@
 
 <file path=ppt/tags/tag6.xml><?xml version="1.0" encoding="utf-8"?>
 <p:tagLst xmlns:a="http://schemas.openxmlformats.org/drawingml/2006/main" xmlns:r="http://schemas.openxmlformats.org/officeDocument/2006/relationships" xmlns:p="http://schemas.openxmlformats.org/presentationml/2006/main">
-  <p:tag name="LATEXADDIN" val="\documentclass{article}&#10;\usepackage{amsmath}&#10;\usepackage{color}&#10;\pagestyle{empty}&#10;\begin{document}&#10;&#10;$&#10;J(\theta) = \frac{1}{m} \sum\limits^{m}_{i=1} \frac{1}{2} \left( h_\theta(x^{(i)}) - y^{(i)} \right)^2&#10;$&#10;% \delta_i^{(l)} = \left(\sum_j W_{ji}^{(l)} \delta_j^{(l+1)}\right) f'(z_i^{(l)})&#10;&#10;&#10;&#10;\end{document}"/>
+  <p:tag name="LATEXADDIN" val="\documentclass{article}&#10;\usepackage{amsmath}&#10;\usepackage{color}&#10;\pagestyle{empty}&#10;\begin{document}&#10;&#10;$&#10;\mathrm{Cost}(h_\theta(x),y) = &#10;\left\{ \begin{array}{rl}&#10;- \mathrm{log}(h_\theta(x)) &amp;\mbox{if $y = 1$} \\&#10;- \mathrm{log}(1-h_\theta(x)) &amp;\mbox{if $y = 0$} &#10;\end{array} \right.&#10;$&#10;% \delta_i^{(l)} = \left(\sum_j W_{ji}^{(l)} \delta_j^{(l+1)}\right) f'(z_i^{(l)})&#10;&#10;&#10;&#10;\end{document}"/>
   <p:tag name="IGUANATEXSIZE" val="24"/>
 </p:tagLst>
 </file>
 
 <file path=ppt/tags/tag7.xml><?xml version="1.0" encoding="utf-8"?>
 <p:tagLst xmlns:a="http://schemas.openxmlformats.org/drawingml/2006/main" xmlns:r="http://schemas.openxmlformats.org/officeDocument/2006/relationships" xmlns:p="http://schemas.openxmlformats.org/presentationml/2006/main">
-  <p:tag name="LATEXADDIN" val="\documentclass{article}&#10;\usepackage{amsmath}&#10;\usepackage{color}&#10;\pagestyle{empty}&#10;\begin{document}&#10;&#10;$&#10;\mathrm{Cost}(h_\theta(x^{(i)}),y^{(i)}) = \frac{1}{2} \left( h_\theta(x^{(i)}) - y^{(i)} \right)^2&#10;$&#10;% \delta_i^{(l)} = \left(\sum_j W_{ji}^{(l)} \delta_j^{(l+1)}\right) f'(z_i^{(l)})&#10;&#10;&#10;&#10;\end{document}"/>
-  <p:tag name="IGUANATEXSIZE" val="24"/>
+  <p:tag name="LATEXADDIN" val="\documentclass{article}&#10;\usepackage{amsmath}&#10;\pagestyle{empty}&#10;\begin{document}&#10;&#10;Cost = 0 if &#10;$ \displaystyle&#10;y = 1, h_\theta(x) = 1&#10;$&#10;&#10;\begin{tabular}{ll}&#10;But as &amp; &#10;$ \displaystyle&#10;h_\theta(x) \rightarrow 0&#10;$&#10;\\&#10;&amp;&#10;$ \displaystyle&#10;Cost \rightarrow \infty&#10;$&#10;\end{tabular}&#10;&#10;\hspace{3mm}&#10;&#10;Captures intuition that if $h_\theta(x) = 0$,&#10;&#10;(predict $P(y=1|x;\theta) = 0)$, but $y=1$, &#10;&#10;we'll penalize learning algorithm by a very &#10;&#10;large cost.&#10;&#10;\end{document}"/>
+  <p:tag name="IGUANATEXSIZE" val="20"/>
 </p:tagLst>
 </file>
 
 <file path=ppt/tags/tag8.xml><?xml version="1.0" encoding="utf-8"?>
 <p:tagLst xmlns:a="http://schemas.openxmlformats.org/drawingml/2006/main" xmlns:r="http://schemas.openxmlformats.org/officeDocument/2006/relationships" xmlns:p="http://schemas.openxmlformats.org/presentationml/2006/main">
-  <p:tag name="LATEXADDIN" val="\documentclass{article}&#10;\usepackage{amsmath}&#10;\pagestyle{empty}&#10;\begin{document}&#10;&#10;&#10;$ \displaystyle&#10;\theta&#10;$&#10;&#10;\end{document}"/>
+  <p:tag name="LATEXADDIN" val="\documentclass{article}&#10;\usepackage{amsmath}&#10;\pagestyle{empty}&#10;\begin{document}&#10;&#10;&#10;$ \displaystyle&#10;h_\theta(x)&#10;$&#10;&#10;\end{document}"/>
   <p:tag name="IGUANATEXSIZE" val="36"/>
 </p:tagLst>
 </file>
 
 <file path=ppt/tags/tag9.xml><?xml version="1.0" encoding="utf-8"?>
 <p:tagLst xmlns:a="http://schemas.openxmlformats.org/drawingml/2006/main" xmlns:r="http://schemas.openxmlformats.org/officeDocument/2006/relationships" xmlns:p="http://schemas.openxmlformats.org/presentationml/2006/main">
-  <p:tag name="LATEXADDIN" val="\documentclass{article}&#10;\usepackage{amsmath}&#10;\pagestyle{empty}&#10;\begin{document}&#10;&#10;&#10;$ \displaystyle&#10;J(\theta)&#10;$&#10;&#10;\end{document}"/>
-  <p:tag name="IGUANATEXSIZE" val="24"/>
+  <p:tag name="LATEXADDIN" val="\documentclass{article}&#10;\usepackage{amsmath}&#10;\pagestyle{empty}&#10;\begin{document}&#10;&#10;&#10;$ \displaystyle&#10;h_\theta(x)&#10;$&#10;&#10;\end{document}"/>
+  <p:tag name="IGUANATEXSIZE" val="36"/>
 </p:tagLst>
 </file>
 

</xml_diff>